<commit_message>
Update template and icon assets
</commit_message>
<xml_diff>
--- a/ym4cut_template.pptx
+++ b/ym4cut_template.pptx
@@ -5,8 +5,8 @@
     <p:sldMasterId id="2147483660" r:id="rId1"/>
   </p:sldMasterIdLst>
   <p:sldIdLst>
-    <p:sldId id="256" r:id="rId2"/>
-    <p:sldId id="257" r:id="rId3"/>
+    <p:sldId id="259" r:id="rId2"/>
+    <p:sldId id="260" r:id="rId3"/>
   </p:sldIdLst>
   <p:sldSz cx="6858000" cy="12192000"/>
   <p:notesSz cx="6858000" cy="9144000"/>
@@ -255,7 +255,7 @@
           <a:p>
             <a:fld id="{5802A5F5-DD2A-4576-86B6-34DB5722830F}" type="datetimeFigureOut">
               <a:rPr lang="ko-KR" altLang="en-US" smtClean="0"/>
-              <a:t>2025-11-08</a:t>
+              <a:t>2025-11-14</a:t>
             </a:fld>
             <a:endParaRPr lang="ko-KR" altLang="en-US"/>
           </a:p>
@@ -425,7 +425,7 @@
           <a:p>
             <a:fld id="{5802A5F5-DD2A-4576-86B6-34DB5722830F}" type="datetimeFigureOut">
               <a:rPr lang="ko-KR" altLang="en-US" smtClean="0"/>
-              <a:t>2025-11-08</a:t>
+              <a:t>2025-11-14</a:t>
             </a:fld>
             <a:endParaRPr lang="ko-KR" altLang="en-US"/>
           </a:p>
@@ -605,7 +605,7 @@
           <a:p>
             <a:fld id="{5802A5F5-DD2A-4576-86B6-34DB5722830F}" type="datetimeFigureOut">
               <a:rPr lang="ko-KR" altLang="en-US" smtClean="0"/>
-              <a:t>2025-11-08</a:t>
+              <a:t>2025-11-14</a:t>
             </a:fld>
             <a:endParaRPr lang="ko-KR" altLang="en-US"/>
           </a:p>
@@ -775,7 +775,7 @@
           <a:p>
             <a:fld id="{5802A5F5-DD2A-4576-86B6-34DB5722830F}" type="datetimeFigureOut">
               <a:rPr lang="ko-KR" altLang="en-US" smtClean="0"/>
-              <a:t>2025-11-08</a:t>
+              <a:t>2025-11-14</a:t>
             </a:fld>
             <a:endParaRPr lang="ko-KR" altLang="en-US"/>
           </a:p>
@@ -1019,7 +1019,7 @@
           <a:p>
             <a:fld id="{5802A5F5-DD2A-4576-86B6-34DB5722830F}" type="datetimeFigureOut">
               <a:rPr lang="ko-KR" altLang="en-US" smtClean="0"/>
-              <a:t>2025-11-08</a:t>
+              <a:t>2025-11-14</a:t>
             </a:fld>
             <a:endParaRPr lang="ko-KR" altLang="en-US"/>
           </a:p>
@@ -1251,7 +1251,7 @@
           <a:p>
             <a:fld id="{5802A5F5-DD2A-4576-86B6-34DB5722830F}" type="datetimeFigureOut">
               <a:rPr lang="ko-KR" altLang="en-US" smtClean="0"/>
-              <a:t>2025-11-08</a:t>
+              <a:t>2025-11-14</a:t>
             </a:fld>
             <a:endParaRPr lang="ko-KR" altLang="en-US"/>
           </a:p>
@@ -1618,7 +1618,7 @@
           <a:p>
             <a:fld id="{5802A5F5-DD2A-4576-86B6-34DB5722830F}" type="datetimeFigureOut">
               <a:rPr lang="ko-KR" altLang="en-US" smtClean="0"/>
-              <a:t>2025-11-08</a:t>
+              <a:t>2025-11-14</a:t>
             </a:fld>
             <a:endParaRPr lang="ko-KR" altLang="en-US"/>
           </a:p>
@@ -1736,7 +1736,7 @@
           <a:p>
             <a:fld id="{5802A5F5-DD2A-4576-86B6-34DB5722830F}" type="datetimeFigureOut">
               <a:rPr lang="ko-KR" altLang="en-US" smtClean="0"/>
-              <a:t>2025-11-08</a:t>
+              <a:t>2025-11-14</a:t>
             </a:fld>
             <a:endParaRPr lang="ko-KR" altLang="en-US"/>
           </a:p>
@@ -1831,7 +1831,7 @@
           <a:p>
             <a:fld id="{5802A5F5-DD2A-4576-86B6-34DB5722830F}" type="datetimeFigureOut">
               <a:rPr lang="ko-KR" altLang="en-US" smtClean="0"/>
-              <a:t>2025-11-08</a:t>
+              <a:t>2025-11-14</a:t>
             </a:fld>
             <a:endParaRPr lang="ko-KR" altLang="en-US"/>
           </a:p>
@@ -2108,7 +2108,7 @@
           <a:p>
             <a:fld id="{5802A5F5-DD2A-4576-86B6-34DB5722830F}" type="datetimeFigureOut">
               <a:rPr lang="ko-KR" altLang="en-US" smtClean="0"/>
-              <a:t>2025-11-08</a:t>
+              <a:t>2025-11-14</a:t>
             </a:fld>
             <a:endParaRPr lang="ko-KR" altLang="en-US"/>
           </a:p>
@@ -2365,7 +2365,7 @@
           <a:p>
             <a:fld id="{5802A5F5-DD2A-4576-86B6-34DB5722830F}" type="datetimeFigureOut">
               <a:rPr lang="ko-KR" altLang="en-US" smtClean="0"/>
-              <a:t>2025-11-08</a:t>
+              <a:t>2025-11-14</a:t>
             </a:fld>
             <a:endParaRPr lang="ko-KR" altLang="en-US"/>
           </a:p>
@@ -2578,7 +2578,7 @@
           <a:p>
             <a:fld id="{5802A5F5-DD2A-4576-86B6-34DB5722830F}" type="datetimeFigureOut">
               <a:rPr lang="ko-KR" altLang="en-US" smtClean="0"/>
-              <a:t>2025-11-08</a:t>
+              <a:t>2025-11-14</a:t>
             </a:fld>
             <a:endParaRPr lang="ko-KR" altLang="en-US"/>
           </a:p>
@@ -2972,14 +2972,22 @@
     <p:bg>
       <p:bgPr>
         <a:solidFill>
-          <a:schemeClr val="bg2"/>
+          <a:schemeClr val="bg1">
+            <a:lumMod val="95000"/>
+          </a:schemeClr>
         </a:solidFill>
         <a:effectLst/>
       </p:bgPr>
     </p:bg>
     <p:spTree>
       <p:nvGrpSpPr>
-        <p:cNvPr id="1" name=""/>
+        <p:cNvPr id="1" name="">
+          <a:extLst>
+            <a:ext uri="{FF2B5EF4-FFF2-40B4-BE49-F238E27FC236}">
+              <a16:creationId xmlns:a16="http://schemas.microsoft.com/office/drawing/2014/main" id="{C81C1F50-01D6-DD8F-2CFE-D4A00C6988CD}"/>
+            </a:ext>
+          </a:extLst>
+        </p:cNvPr>
         <p:cNvGrpSpPr/>
         <p:nvPr/>
       </p:nvGrpSpPr>
@@ -2996,23 +3004,25 @@
           <p:cNvPr id="4" name="직사각형 3">
             <a:extLst>
               <a:ext uri="{FF2B5EF4-FFF2-40B4-BE49-F238E27FC236}">
-                <a16:creationId xmlns:a16="http://schemas.microsoft.com/office/drawing/2014/main" id="{31F42851-A1C6-70AC-873C-6DB1E6043F1B}"/>
+                <a16:creationId xmlns:a16="http://schemas.microsoft.com/office/drawing/2014/main" id="{5BC8566E-A94B-10AC-6B5C-EA93C1A26FB8}"/>
               </a:ext>
             </a:extLst>
           </p:cNvPr>
-          <p:cNvSpPr/>
+          <p:cNvSpPr>
+            <a:spLocks/>
+          </p:cNvSpPr>
           <p:nvPr/>
         </p:nvSpPr>
         <p:spPr>
           <a:xfrm>
-            <a:off x="3429000" y="624000"/>
-            <a:ext cx="1800000" cy="5472000"/>
+            <a:off x="1988840" y="335360"/>
+            <a:ext cx="3600000" cy="10656608"/>
           </a:xfrm>
           <a:prstGeom prst="rect">
             <a:avLst/>
           </a:prstGeom>
           <a:solidFill>
-            <a:schemeClr val="bg1"/>
+            <a:schemeClr val="tx1"/>
           </a:solidFill>
           <a:ln>
             <a:noFill/>
@@ -3048,17 +3058,19 @@
           <p:cNvPr id="5" name="직사각형 4">
             <a:extLst>
               <a:ext uri="{FF2B5EF4-FFF2-40B4-BE49-F238E27FC236}">
-                <a16:creationId xmlns:a16="http://schemas.microsoft.com/office/drawing/2014/main" id="{C7B2CD54-54CC-28E9-89C7-C88F72ABC9C7}"/>
+                <a16:creationId xmlns:a16="http://schemas.microsoft.com/office/drawing/2014/main" id="{3998A2A6-0417-5CE9-13B9-05347553BE62}"/>
               </a:ext>
             </a:extLst>
           </p:cNvPr>
-          <p:cNvSpPr/>
+          <p:cNvSpPr>
+            <a:spLocks/>
+          </p:cNvSpPr>
           <p:nvPr/>
         </p:nvSpPr>
         <p:spPr>
           <a:xfrm>
-            <a:off x="3522175" y="767408"/>
-            <a:ext cx="1620000" cy="1080000"/>
+            <a:off x="2175211" y="605800"/>
+            <a:ext cx="3240000" cy="2059200"/>
           </a:xfrm>
           <a:prstGeom prst="rect">
             <a:avLst/>
@@ -3102,17 +3114,19 @@
           <p:cNvPr id="6" name="직사각형 5">
             <a:extLst>
               <a:ext uri="{FF2B5EF4-FFF2-40B4-BE49-F238E27FC236}">
-                <a16:creationId xmlns:a16="http://schemas.microsoft.com/office/drawing/2014/main" id="{DAF27F23-3761-79D2-E1C1-C364F45BE15D}"/>
+                <a16:creationId xmlns:a16="http://schemas.microsoft.com/office/drawing/2014/main" id="{DA876D69-1F44-6C9C-0C84-0A58D8430460}"/>
               </a:ext>
             </a:extLst>
           </p:cNvPr>
-          <p:cNvSpPr/>
+          <p:cNvSpPr>
+            <a:spLocks/>
+          </p:cNvSpPr>
           <p:nvPr/>
         </p:nvSpPr>
         <p:spPr>
           <a:xfrm>
-            <a:off x="3522175" y="1950278"/>
-            <a:ext cx="1620000" cy="1080000"/>
+            <a:off x="2175211" y="2831465"/>
+            <a:ext cx="3240000" cy="2059200"/>
           </a:xfrm>
           <a:prstGeom prst="rect">
             <a:avLst/>
@@ -3156,17 +3170,19 @@
           <p:cNvPr id="8" name="직사각형 7">
             <a:extLst>
               <a:ext uri="{FF2B5EF4-FFF2-40B4-BE49-F238E27FC236}">
-                <a16:creationId xmlns:a16="http://schemas.microsoft.com/office/drawing/2014/main" id="{36F889EE-6D48-CF36-993C-4C3FD83D0C4F}"/>
+                <a16:creationId xmlns:a16="http://schemas.microsoft.com/office/drawing/2014/main" id="{CA0D6EB0-D510-8BE1-FF4F-047D493D2827}"/>
               </a:ext>
             </a:extLst>
           </p:cNvPr>
-          <p:cNvSpPr/>
+          <p:cNvSpPr>
+            <a:spLocks/>
+          </p:cNvSpPr>
           <p:nvPr/>
         </p:nvSpPr>
         <p:spPr>
           <a:xfrm>
-            <a:off x="3522175" y="3133149"/>
-            <a:ext cx="1620000" cy="1080000"/>
+            <a:off x="2175211" y="5057130"/>
+            <a:ext cx="3240360" cy="2059200"/>
           </a:xfrm>
           <a:prstGeom prst="rect">
             <a:avLst/>
@@ -3210,17 +3226,19 @@
           <p:cNvPr id="9" name="직사각형 8">
             <a:extLst>
               <a:ext uri="{FF2B5EF4-FFF2-40B4-BE49-F238E27FC236}">
-                <a16:creationId xmlns:a16="http://schemas.microsoft.com/office/drawing/2014/main" id="{29B84D59-88BC-2AA6-5FE1-05CB421FF7A0}"/>
+                <a16:creationId xmlns:a16="http://schemas.microsoft.com/office/drawing/2014/main" id="{10605D6D-6B5B-13CA-8FA9-1CE6B432B8D1}"/>
               </a:ext>
             </a:extLst>
           </p:cNvPr>
-          <p:cNvSpPr/>
+          <p:cNvSpPr>
+            <a:spLocks/>
+          </p:cNvSpPr>
           <p:nvPr/>
         </p:nvSpPr>
         <p:spPr>
           <a:xfrm>
-            <a:off x="3522175" y="4316018"/>
-            <a:ext cx="1620000" cy="1080000"/>
+            <a:off x="2175211" y="7282791"/>
+            <a:ext cx="3240360" cy="2059200"/>
           </a:xfrm>
           <a:prstGeom prst="rect">
             <a:avLst/>
@@ -3261,20 +3279,206 @@
       </p:sp>
       <p:sp>
         <p:nvSpPr>
-          <p:cNvPr id="10" name="직사각형 9">
+          <p:cNvPr id="15" name="직사각형 14">
             <a:extLst>
               <a:ext uri="{FF2B5EF4-FFF2-40B4-BE49-F238E27FC236}">
-                <a16:creationId xmlns:a16="http://schemas.microsoft.com/office/drawing/2014/main" id="{16029625-2115-3416-F88C-E2E2F06EE3F9}"/>
+                <a16:creationId xmlns:a16="http://schemas.microsoft.com/office/drawing/2014/main" id="{ADE2D373-BCB6-60C6-C0AB-C0A56ADE0221}"/>
               </a:ext>
             </a:extLst>
           </p:cNvPr>
-          <p:cNvSpPr/>
+          <p:cNvSpPr>
+            <a:spLocks noChangeAspect="1"/>
+          </p:cNvSpPr>
           <p:nvPr/>
         </p:nvSpPr>
         <p:spPr>
           <a:xfrm>
-            <a:off x="3700352" y="5563875"/>
-            <a:ext cx="1257300" cy="389040"/>
+            <a:off x="2528900" y="9732404"/>
+            <a:ext cx="2514879" cy="757604"/>
+          </a:xfrm>
+          <a:prstGeom prst="rect">
+            <a:avLst/>
+          </a:prstGeom>
+          <a:solidFill>
+            <a:schemeClr val="tx1"/>
+          </a:solidFill>
+          <a:ln>
+            <a:noFill/>
+          </a:ln>
+        </p:spPr>
+        <p:style>
+          <a:lnRef idx="2">
+            <a:schemeClr val="accent1">
+              <a:shade val="15000"/>
+            </a:schemeClr>
+          </a:lnRef>
+          <a:fillRef idx="1">
+            <a:schemeClr val="accent1"/>
+          </a:fillRef>
+          <a:effectRef idx="0">
+            <a:schemeClr val="accent1"/>
+          </a:effectRef>
+          <a:fontRef idx="minor">
+            <a:schemeClr val="lt1"/>
+          </a:fontRef>
+        </p:style>
+        <p:txBody>
+          <a:bodyPr rtlCol="0" anchor="ctr"/>
+          <a:lstStyle/>
+          <a:p>
+            <a:pPr algn="ctr"/>
+            <a:r>
+              <a:rPr lang="ko-KR" altLang="en-US" sz="2400" spc="-150" dirty="0" err="1">
+                <a:solidFill>
+                  <a:schemeClr val="bg1"/>
+                </a:solidFill>
+                <a:latin typeface="ONE 모바일고딕 Title OTF" panose="00000500000000000000" pitchFamily="50" charset="-127"/>
+                <a:ea typeface="ONE 모바일고딕 Title OTF" panose="00000500000000000000" pitchFamily="50" charset="-127"/>
+              </a:rPr>
+              <a:t>용중네컷</a:t>
+            </a:r>
+            <a:endParaRPr lang="ko-KR" altLang="en-US" sz="2800" spc="-150" dirty="0">
+              <a:solidFill>
+                <a:schemeClr val="bg1"/>
+              </a:solidFill>
+              <a:latin typeface="ONE 모바일고딕 Title OTF" panose="00000500000000000000" pitchFamily="50" charset="-127"/>
+              <a:ea typeface="ONE 모바일고딕 Title OTF" panose="00000500000000000000" pitchFamily="50" charset="-127"/>
+            </a:endParaRPr>
+          </a:p>
+        </p:txBody>
+      </p:sp>
+      <p:sp>
+        <p:nvSpPr>
+          <p:cNvPr id="16" name="직사각형 15">
+            <a:extLst>
+              <a:ext uri="{FF2B5EF4-FFF2-40B4-BE49-F238E27FC236}">
+                <a16:creationId xmlns:a16="http://schemas.microsoft.com/office/drawing/2014/main" id="{0DF3B6C3-C7AC-98AB-6494-DAE2BBBE0060}"/>
+              </a:ext>
+            </a:extLst>
+          </p:cNvPr>
+          <p:cNvSpPr>
+            <a:spLocks noChangeAspect="1"/>
+          </p:cNvSpPr>
+          <p:nvPr/>
+        </p:nvSpPr>
+        <p:spPr>
+          <a:xfrm>
+            <a:off x="2528900" y="10308468"/>
+            <a:ext cx="2514879" cy="236306"/>
+          </a:xfrm>
+          <a:prstGeom prst="rect">
+            <a:avLst/>
+          </a:prstGeom>
+          <a:noFill/>
+          <a:ln>
+            <a:noFill/>
+          </a:ln>
+        </p:spPr>
+        <p:style>
+          <a:lnRef idx="2">
+            <a:schemeClr val="accent1">
+              <a:shade val="15000"/>
+            </a:schemeClr>
+          </a:lnRef>
+          <a:fillRef idx="1">
+            <a:schemeClr val="accent1"/>
+          </a:fillRef>
+          <a:effectRef idx="0">
+            <a:schemeClr val="accent1"/>
+          </a:effectRef>
+          <a:fontRef idx="minor">
+            <a:schemeClr val="lt1"/>
+          </a:fontRef>
+        </p:style>
+        <p:txBody>
+          <a:bodyPr rtlCol="0" anchor="ctr"/>
+          <a:lstStyle/>
+          <a:p>
+            <a:pPr algn="ctr"/>
+            <a:r>
+              <a:rPr lang="en-US" altLang="ko-KR" sz="1400" spc="-150" dirty="0">
+                <a:solidFill>
+                  <a:schemeClr val="bg1"/>
+                </a:solidFill>
+                <a:latin typeface="Harlow Solid Italic" panose="04030604020F02020D02" pitchFamily="82" charset="0"/>
+                <a:ea typeface="HY얕은샘물M" panose="02030600000101010101" pitchFamily="18" charset="-127"/>
+              </a:rPr>
+              <a:t>20260109</a:t>
+            </a:r>
+            <a:endParaRPr lang="ko-KR" altLang="en-US" sz="2800" spc="-150" dirty="0">
+              <a:solidFill>
+                <a:schemeClr val="bg1"/>
+              </a:solidFill>
+              <a:latin typeface="Harlow Solid Italic" panose="04030604020F02020D02" pitchFamily="82" charset="0"/>
+              <a:ea typeface="HY얕은샘물M" panose="02030600000101010101" pitchFamily="18" charset="-127"/>
+            </a:endParaRPr>
+          </a:p>
+        </p:txBody>
+      </p:sp>
+    </p:spTree>
+    <p:extLst>
+      <p:ext uri="{BB962C8B-B14F-4D97-AF65-F5344CB8AC3E}">
+        <p14:creationId xmlns:p14="http://schemas.microsoft.com/office/powerpoint/2010/main" val="1234156915"/>
+      </p:ext>
+    </p:extLst>
+  </p:cSld>
+  <p:clrMapOvr>
+    <a:masterClrMapping/>
+  </p:clrMapOvr>
+</p:sld>
+</file>
+
+<file path=ppt/slides/slide2.xml><?xml version="1.0" encoding="utf-8"?>
+<p:sld xmlns:a="http://schemas.openxmlformats.org/drawingml/2006/main" xmlns:r="http://schemas.openxmlformats.org/officeDocument/2006/relationships" xmlns:p="http://schemas.openxmlformats.org/presentationml/2006/main">
+  <p:cSld>
+    <p:bg>
+      <p:bgPr>
+        <a:solidFill>
+          <a:schemeClr val="bg1">
+            <a:lumMod val="95000"/>
+          </a:schemeClr>
+        </a:solidFill>
+        <a:effectLst/>
+      </p:bgPr>
+    </p:bg>
+    <p:spTree>
+      <p:nvGrpSpPr>
+        <p:cNvPr id="1" name="">
+          <a:extLst>
+            <a:ext uri="{FF2B5EF4-FFF2-40B4-BE49-F238E27FC236}">
+              <a16:creationId xmlns:a16="http://schemas.microsoft.com/office/drawing/2014/main" id="{392F5892-16F0-6F96-4E18-6C6AFBDFCC99}"/>
+            </a:ext>
+          </a:extLst>
+        </p:cNvPr>
+        <p:cNvGrpSpPr/>
+        <p:nvPr/>
+      </p:nvGrpSpPr>
+      <p:grpSpPr>
+        <a:xfrm>
+          <a:off x="0" y="0"/>
+          <a:ext cx="0" cy="0"/>
+          <a:chOff x="0" y="0"/>
+          <a:chExt cx="0" cy="0"/>
+        </a:xfrm>
+      </p:grpSpPr>
+      <p:sp>
+        <p:nvSpPr>
+          <p:cNvPr id="4" name="직사각형 3">
+            <a:extLst>
+              <a:ext uri="{FF2B5EF4-FFF2-40B4-BE49-F238E27FC236}">
+                <a16:creationId xmlns:a16="http://schemas.microsoft.com/office/drawing/2014/main" id="{1F895048-051F-7FA7-C368-C1087AB8AF54}"/>
+              </a:ext>
+            </a:extLst>
+          </p:cNvPr>
+          <p:cNvSpPr>
+            <a:spLocks/>
+          </p:cNvSpPr>
+          <p:nvPr/>
+        </p:nvSpPr>
+        <p:spPr>
+          <a:xfrm>
+            <a:off x="1988840" y="335360"/>
+            <a:ext cx="3600000" cy="10656608"/>
           </a:xfrm>
           <a:prstGeom prst="rect">
             <a:avLst/>
@@ -3307,8 +3511,284 @@
           <a:lstStyle/>
           <a:p>
             <a:pPr algn="ctr"/>
-            <a:r>
-              <a:rPr lang="ko-KR" altLang="en-US" sz="1600" dirty="0" err="1">
+            <a:endParaRPr lang="ko-KR" altLang="en-US" sz="1801" dirty="0"/>
+          </a:p>
+        </p:txBody>
+      </p:sp>
+      <p:sp>
+        <p:nvSpPr>
+          <p:cNvPr id="5" name="직사각형 4">
+            <a:extLst>
+              <a:ext uri="{FF2B5EF4-FFF2-40B4-BE49-F238E27FC236}">
+                <a16:creationId xmlns:a16="http://schemas.microsoft.com/office/drawing/2014/main" id="{84B3A4AB-3D9C-3264-E7D3-2A47686CFDE1}"/>
+              </a:ext>
+            </a:extLst>
+          </p:cNvPr>
+          <p:cNvSpPr>
+            <a:spLocks/>
+          </p:cNvSpPr>
+          <p:nvPr/>
+        </p:nvSpPr>
+        <p:spPr>
+          <a:xfrm>
+            <a:off x="2175211" y="605800"/>
+            <a:ext cx="3240000" cy="2059200"/>
+          </a:xfrm>
+          <a:prstGeom prst="rect">
+            <a:avLst/>
+          </a:prstGeom>
+          <a:solidFill>
+            <a:schemeClr val="bg1"/>
+          </a:solidFill>
+          <a:ln>
+            <a:solidFill>
+              <a:schemeClr val="tx1"/>
+            </a:solidFill>
+          </a:ln>
+        </p:spPr>
+        <p:style>
+          <a:lnRef idx="2">
+            <a:schemeClr val="accent1">
+              <a:shade val="15000"/>
+            </a:schemeClr>
+          </a:lnRef>
+          <a:fillRef idx="1">
+            <a:schemeClr val="accent1"/>
+          </a:fillRef>
+          <a:effectRef idx="0">
+            <a:schemeClr val="accent1"/>
+          </a:effectRef>
+          <a:fontRef idx="minor">
+            <a:schemeClr val="lt1"/>
+          </a:fontRef>
+        </p:style>
+        <p:txBody>
+          <a:bodyPr rtlCol="0" anchor="ctr"/>
+          <a:lstStyle/>
+          <a:p>
+            <a:pPr algn="ctr"/>
+            <a:endParaRPr lang="ko-KR" altLang="en-US" sz="1801" dirty="0"/>
+          </a:p>
+        </p:txBody>
+      </p:sp>
+      <p:sp>
+        <p:nvSpPr>
+          <p:cNvPr id="6" name="직사각형 5">
+            <a:extLst>
+              <a:ext uri="{FF2B5EF4-FFF2-40B4-BE49-F238E27FC236}">
+                <a16:creationId xmlns:a16="http://schemas.microsoft.com/office/drawing/2014/main" id="{40E52DAE-69EC-D172-5700-E3AFC72B555C}"/>
+              </a:ext>
+            </a:extLst>
+          </p:cNvPr>
+          <p:cNvSpPr>
+            <a:spLocks/>
+          </p:cNvSpPr>
+          <p:nvPr/>
+        </p:nvSpPr>
+        <p:spPr>
+          <a:xfrm>
+            <a:off x="2175211" y="2831465"/>
+            <a:ext cx="3240000" cy="2059200"/>
+          </a:xfrm>
+          <a:prstGeom prst="rect">
+            <a:avLst/>
+          </a:prstGeom>
+          <a:solidFill>
+            <a:schemeClr val="bg1"/>
+          </a:solidFill>
+          <a:ln>
+            <a:solidFill>
+              <a:schemeClr val="tx1"/>
+            </a:solidFill>
+          </a:ln>
+        </p:spPr>
+        <p:style>
+          <a:lnRef idx="2">
+            <a:schemeClr val="accent1">
+              <a:shade val="15000"/>
+            </a:schemeClr>
+          </a:lnRef>
+          <a:fillRef idx="1">
+            <a:schemeClr val="accent1"/>
+          </a:fillRef>
+          <a:effectRef idx="0">
+            <a:schemeClr val="accent1"/>
+          </a:effectRef>
+          <a:fontRef idx="minor">
+            <a:schemeClr val="lt1"/>
+          </a:fontRef>
+        </p:style>
+        <p:txBody>
+          <a:bodyPr rtlCol="0" anchor="ctr"/>
+          <a:lstStyle/>
+          <a:p>
+            <a:pPr algn="r"/>
+            <a:endParaRPr lang="ko-KR" altLang="en-US" sz="1801" dirty="0"/>
+          </a:p>
+        </p:txBody>
+      </p:sp>
+      <p:sp>
+        <p:nvSpPr>
+          <p:cNvPr id="8" name="직사각형 7">
+            <a:extLst>
+              <a:ext uri="{FF2B5EF4-FFF2-40B4-BE49-F238E27FC236}">
+                <a16:creationId xmlns:a16="http://schemas.microsoft.com/office/drawing/2014/main" id="{FE979DDF-76C7-0831-96B7-468DE5544D79}"/>
+              </a:ext>
+            </a:extLst>
+          </p:cNvPr>
+          <p:cNvSpPr>
+            <a:spLocks/>
+          </p:cNvSpPr>
+          <p:nvPr/>
+        </p:nvSpPr>
+        <p:spPr>
+          <a:xfrm>
+            <a:off x="2175211" y="5057130"/>
+            <a:ext cx="3240360" cy="2059200"/>
+          </a:xfrm>
+          <a:prstGeom prst="rect">
+            <a:avLst/>
+          </a:prstGeom>
+          <a:solidFill>
+            <a:schemeClr val="bg1"/>
+          </a:solidFill>
+          <a:ln>
+            <a:solidFill>
+              <a:schemeClr val="tx1"/>
+            </a:solidFill>
+          </a:ln>
+        </p:spPr>
+        <p:style>
+          <a:lnRef idx="2">
+            <a:schemeClr val="accent1">
+              <a:shade val="15000"/>
+            </a:schemeClr>
+          </a:lnRef>
+          <a:fillRef idx="1">
+            <a:schemeClr val="accent1"/>
+          </a:fillRef>
+          <a:effectRef idx="0">
+            <a:schemeClr val="accent1"/>
+          </a:effectRef>
+          <a:fontRef idx="minor">
+            <a:schemeClr val="lt1"/>
+          </a:fontRef>
+        </p:style>
+        <p:txBody>
+          <a:bodyPr rtlCol="0" anchor="ctr"/>
+          <a:lstStyle/>
+          <a:p>
+            <a:pPr algn="r"/>
+            <a:endParaRPr lang="ko-KR" altLang="en-US" sz="1801" dirty="0"/>
+          </a:p>
+        </p:txBody>
+      </p:sp>
+      <p:sp>
+        <p:nvSpPr>
+          <p:cNvPr id="9" name="직사각형 8">
+            <a:extLst>
+              <a:ext uri="{FF2B5EF4-FFF2-40B4-BE49-F238E27FC236}">
+                <a16:creationId xmlns:a16="http://schemas.microsoft.com/office/drawing/2014/main" id="{866EB5E5-194E-36F1-0A4F-BE693D1826EA}"/>
+              </a:ext>
+            </a:extLst>
+          </p:cNvPr>
+          <p:cNvSpPr>
+            <a:spLocks/>
+          </p:cNvSpPr>
+          <p:nvPr/>
+        </p:nvSpPr>
+        <p:spPr>
+          <a:xfrm>
+            <a:off x="2175211" y="7282791"/>
+            <a:ext cx="3240360" cy="2059200"/>
+          </a:xfrm>
+          <a:prstGeom prst="rect">
+            <a:avLst/>
+          </a:prstGeom>
+          <a:solidFill>
+            <a:schemeClr val="bg1"/>
+          </a:solidFill>
+          <a:ln>
+            <a:solidFill>
+              <a:schemeClr val="tx1"/>
+            </a:solidFill>
+          </a:ln>
+        </p:spPr>
+        <p:style>
+          <a:lnRef idx="2">
+            <a:schemeClr val="accent1">
+              <a:shade val="15000"/>
+            </a:schemeClr>
+          </a:lnRef>
+          <a:fillRef idx="1">
+            <a:schemeClr val="accent1"/>
+          </a:fillRef>
+          <a:effectRef idx="0">
+            <a:schemeClr val="accent1"/>
+          </a:effectRef>
+          <a:fontRef idx="minor">
+            <a:schemeClr val="lt1"/>
+          </a:fontRef>
+        </p:style>
+        <p:txBody>
+          <a:bodyPr rtlCol="0" anchor="ctr"/>
+          <a:lstStyle/>
+          <a:p>
+            <a:pPr algn="r"/>
+            <a:endParaRPr lang="ko-KR" altLang="en-US" sz="1801" dirty="0"/>
+          </a:p>
+        </p:txBody>
+      </p:sp>
+      <p:sp>
+        <p:nvSpPr>
+          <p:cNvPr id="15" name="직사각형 14">
+            <a:extLst>
+              <a:ext uri="{FF2B5EF4-FFF2-40B4-BE49-F238E27FC236}">
+                <a16:creationId xmlns:a16="http://schemas.microsoft.com/office/drawing/2014/main" id="{A7AAE446-E984-6884-8A43-1B48030AA462}"/>
+              </a:ext>
+            </a:extLst>
+          </p:cNvPr>
+          <p:cNvSpPr>
+            <a:spLocks noChangeAspect="1"/>
+          </p:cNvSpPr>
+          <p:nvPr/>
+        </p:nvSpPr>
+        <p:spPr>
+          <a:xfrm>
+            <a:off x="2528900" y="9732404"/>
+            <a:ext cx="2514879" cy="757604"/>
+          </a:xfrm>
+          <a:prstGeom prst="rect">
+            <a:avLst/>
+          </a:prstGeom>
+          <a:noFill/>
+          <a:ln>
+            <a:noFill/>
+          </a:ln>
+        </p:spPr>
+        <p:style>
+          <a:lnRef idx="2">
+            <a:schemeClr val="accent1">
+              <a:shade val="15000"/>
+            </a:schemeClr>
+          </a:lnRef>
+          <a:fillRef idx="1">
+            <a:schemeClr val="accent1"/>
+          </a:fillRef>
+          <a:effectRef idx="0">
+            <a:schemeClr val="accent1"/>
+          </a:effectRef>
+          <a:fontRef idx="minor">
+            <a:schemeClr val="lt1"/>
+          </a:fontRef>
+        </p:style>
+        <p:txBody>
+          <a:bodyPr rtlCol="0" anchor="ctr"/>
+          <a:lstStyle/>
+          <a:p>
+            <a:pPr algn="ctr"/>
+            <a:r>
+              <a:rPr lang="ko-KR" altLang="en-US" sz="2400" spc="-150" dirty="0" err="1">
                 <a:solidFill>
                   <a:schemeClr val="tx1"/>
                 </a:solidFill>
@@ -3317,7 +3797,7 @@
               </a:rPr>
               <a:t>용중네컷</a:t>
             </a:r>
-            <a:endParaRPr lang="ko-KR" altLang="en-US" sz="1600" dirty="0">
+            <a:endParaRPr lang="ko-KR" altLang="en-US" sz="2800" spc="-150" dirty="0">
               <a:solidFill>
                 <a:schemeClr val="tx1"/>
               </a:solidFill>
@@ -3327,425 +3807,78 @@
           </a:p>
         </p:txBody>
       </p:sp>
+      <p:sp>
+        <p:nvSpPr>
+          <p:cNvPr id="16" name="직사각형 15">
+            <a:extLst>
+              <a:ext uri="{FF2B5EF4-FFF2-40B4-BE49-F238E27FC236}">
+                <a16:creationId xmlns:a16="http://schemas.microsoft.com/office/drawing/2014/main" id="{71224366-CBBA-4992-929A-D294A1D0BE61}"/>
+              </a:ext>
+            </a:extLst>
+          </p:cNvPr>
+          <p:cNvSpPr>
+            <a:spLocks noChangeAspect="1"/>
+          </p:cNvSpPr>
+          <p:nvPr/>
+        </p:nvSpPr>
+        <p:spPr>
+          <a:xfrm>
+            <a:off x="2528900" y="10308468"/>
+            <a:ext cx="2514879" cy="236306"/>
+          </a:xfrm>
+          <a:prstGeom prst="rect">
+            <a:avLst/>
+          </a:prstGeom>
+          <a:noFill/>
+          <a:ln>
+            <a:noFill/>
+          </a:ln>
+        </p:spPr>
+        <p:style>
+          <a:lnRef idx="2">
+            <a:schemeClr val="accent1">
+              <a:shade val="15000"/>
+            </a:schemeClr>
+          </a:lnRef>
+          <a:fillRef idx="1">
+            <a:schemeClr val="accent1"/>
+          </a:fillRef>
+          <a:effectRef idx="0">
+            <a:schemeClr val="accent1"/>
+          </a:effectRef>
+          <a:fontRef idx="minor">
+            <a:schemeClr val="lt1"/>
+          </a:fontRef>
+        </p:style>
+        <p:txBody>
+          <a:bodyPr rtlCol="0" anchor="ctr"/>
+          <a:lstStyle/>
+          <a:p>
+            <a:pPr algn="ctr"/>
+            <a:r>
+              <a:rPr lang="en-US" altLang="ko-KR" sz="1400" spc="-150" dirty="0">
+                <a:solidFill>
+                  <a:schemeClr val="tx1"/>
+                </a:solidFill>
+                <a:latin typeface="Harlow Solid Italic" panose="04030604020F02020D02" pitchFamily="82" charset="0"/>
+                <a:ea typeface="HY얕은샘물M" panose="02030600000101010101" pitchFamily="18" charset="-127"/>
+              </a:rPr>
+              <a:t>20260109</a:t>
+            </a:r>
+            <a:endParaRPr lang="ko-KR" altLang="en-US" sz="2800" spc="-150" dirty="0">
+              <a:solidFill>
+                <a:schemeClr val="tx1"/>
+              </a:solidFill>
+              <a:latin typeface="Harlow Solid Italic" panose="04030604020F02020D02" pitchFamily="82" charset="0"/>
+              <a:ea typeface="HY얕은샘물M" panose="02030600000101010101" pitchFamily="18" charset="-127"/>
+            </a:endParaRPr>
+          </a:p>
+        </p:txBody>
+      </p:sp>
     </p:spTree>
     <p:extLst>
       <p:ext uri="{BB962C8B-B14F-4D97-AF65-F5344CB8AC3E}">
-        <p14:creationId xmlns:p14="http://schemas.microsoft.com/office/powerpoint/2010/main" val="2209819218"/>
-      </p:ext>
-    </p:extLst>
-  </p:cSld>
-  <p:clrMapOvr>
-    <a:masterClrMapping/>
-  </p:clrMapOvr>
-</p:sld>
-</file>
-
-<file path=ppt/slides/slide2.xml><?xml version="1.0" encoding="utf-8"?>
-<p:sld xmlns:a="http://schemas.openxmlformats.org/drawingml/2006/main" xmlns:r="http://schemas.openxmlformats.org/officeDocument/2006/relationships" xmlns:p="http://schemas.openxmlformats.org/presentationml/2006/main">
-  <p:cSld>
-    <p:bg>
-      <p:bgPr>
-        <a:solidFill>
-          <a:schemeClr val="bg1">
-            <a:lumMod val="95000"/>
-          </a:schemeClr>
-        </a:solidFill>
-        <a:effectLst/>
-      </p:bgPr>
-    </p:bg>
-    <p:spTree>
-      <p:nvGrpSpPr>
-        <p:cNvPr id="1" name="">
-          <a:extLst>
-            <a:ext uri="{FF2B5EF4-FFF2-40B4-BE49-F238E27FC236}">
-              <a16:creationId xmlns:a16="http://schemas.microsoft.com/office/drawing/2014/main" id="{E6D6FA71-CE3C-F356-3229-14ABA2536D0D}"/>
-            </a:ext>
-          </a:extLst>
-        </p:cNvPr>
-        <p:cNvGrpSpPr/>
-        <p:nvPr/>
-      </p:nvGrpSpPr>
-      <p:grpSpPr>
-        <a:xfrm>
-          <a:off x="0" y="0"/>
-          <a:ext cx="0" cy="0"/>
-          <a:chOff x="0" y="0"/>
-          <a:chExt cx="0" cy="0"/>
-        </a:xfrm>
-      </p:grpSpPr>
-      <p:grpSp>
-        <p:nvGrpSpPr>
-          <p:cNvPr id="2" name="그룹 1">
-            <a:extLst>
-              <a:ext uri="{FF2B5EF4-FFF2-40B4-BE49-F238E27FC236}">
-                <a16:creationId xmlns:a16="http://schemas.microsoft.com/office/drawing/2014/main" id="{ED2C15FB-2DC8-3FD9-BFAE-77D3A3BC9C0D}"/>
-              </a:ext>
-            </a:extLst>
-          </p:cNvPr>
-          <p:cNvGrpSpPr/>
-          <p:nvPr/>
-        </p:nvGrpSpPr>
-        <p:grpSpPr>
-          <a:xfrm>
-            <a:off x="1988840" y="624000"/>
-            <a:ext cx="3600400" cy="10945216"/>
-            <a:chOff x="3429000" y="624000"/>
-            <a:chExt cx="1800000" cy="5472000"/>
-          </a:xfrm>
-        </p:grpSpPr>
-        <p:sp>
-          <p:nvSpPr>
-            <p:cNvPr id="4" name="직사각형 3">
-              <a:extLst>
-                <a:ext uri="{FF2B5EF4-FFF2-40B4-BE49-F238E27FC236}">
-                  <a16:creationId xmlns:a16="http://schemas.microsoft.com/office/drawing/2014/main" id="{C51CF1F2-DE6F-B2B6-40D3-272B59B57C59}"/>
-                </a:ext>
-              </a:extLst>
-            </p:cNvPr>
-            <p:cNvSpPr>
-              <a:spLocks noChangeAspect="1"/>
-            </p:cNvSpPr>
-            <p:nvPr/>
-          </p:nvSpPr>
-          <p:spPr>
-            <a:xfrm>
-              <a:off x="3429000" y="624000"/>
-              <a:ext cx="1800000" cy="5472000"/>
-            </a:xfrm>
-            <a:prstGeom prst="rect">
-              <a:avLst/>
-            </a:prstGeom>
-            <a:solidFill>
-              <a:schemeClr val="bg1"/>
-            </a:solidFill>
-            <a:ln>
-              <a:noFill/>
-            </a:ln>
-          </p:spPr>
-          <p:style>
-            <a:lnRef idx="2">
-              <a:schemeClr val="accent1">
-                <a:shade val="15000"/>
-              </a:schemeClr>
-            </a:lnRef>
-            <a:fillRef idx="1">
-              <a:schemeClr val="accent1"/>
-            </a:fillRef>
-            <a:effectRef idx="0">
-              <a:schemeClr val="accent1"/>
-            </a:effectRef>
-            <a:fontRef idx="minor">
-              <a:schemeClr val="lt1"/>
-            </a:fontRef>
-          </p:style>
-          <p:txBody>
-            <a:bodyPr rtlCol="0" anchor="ctr"/>
-            <a:lstStyle/>
-            <a:p>
-              <a:pPr algn="ctr"/>
-              <a:endParaRPr lang="ko-KR" altLang="en-US" sz="1801" dirty="0"/>
-            </a:p>
-          </p:txBody>
-        </p:sp>
-        <p:sp>
-          <p:nvSpPr>
-            <p:cNvPr id="5" name="직사각형 4">
-              <a:extLst>
-                <a:ext uri="{FF2B5EF4-FFF2-40B4-BE49-F238E27FC236}">
-                  <a16:creationId xmlns:a16="http://schemas.microsoft.com/office/drawing/2014/main" id="{227F941B-9D7D-6867-B08E-A9DC05DD7902}"/>
-                </a:ext>
-              </a:extLst>
-            </p:cNvPr>
-            <p:cNvSpPr>
-              <a:spLocks noChangeAspect="1"/>
-            </p:cNvSpPr>
-            <p:nvPr/>
-          </p:nvSpPr>
-          <p:spPr>
-            <a:xfrm>
-              <a:off x="3522175" y="767408"/>
-              <a:ext cx="1620000" cy="1080000"/>
-            </a:xfrm>
-            <a:prstGeom prst="rect">
-              <a:avLst/>
-            </a:prstGeom>
-            <a:solidFill>
-              <a:schemeClr val="bg1"/>
-            </a:solidFill>
-            <a:ln>
-              <a:solidFill>
-                <a:schemeClr val="tx1"/>
-              </a:solidFill>
-            </a:ln>
-          </p:spPr>
-          <p:style>
-            <a:lnRef idx="2">
-              <a:schemeClr val="accent1">
-                <a:shade val="15000"/>
-              </a:schemeClr>
-            </a:lnRef>
-            <a:fillRef idx="1">
-              <a:schemeClr val="accent1"/>
-            </a:fillRef>
-            <a:effectRef idx="0">
-              <a:schemeClr val="accent1"/>
-            </a:effectRef>
-            <a:fontRef idx="minor">
-              <a:schemeClr val="lt1"/>
-            </a:fontRef>
-          </p:style>
-          <p:txBody>
-            <a:bodyPr rtlCol="0" anchor="ctr"/>
-            <a:lstStyle/>
-            <a:p>
-              <a:pPr algn="ctr"/>
-              <a:endParaRPr lang="ko-KR" altLang="en-US" sz="1801" dirty="0"/>
-            </a:p>
-          </p:txBody>
-        </p:sp>
-        <p:sp>
-          <p:nvSpPr>
-            <p:cNvPr id="6" name="직사각형 5">
-              <a:extLst>
-                <a:ext uri="{FF2B5EF4-FFF2-40B4-BE49-F238E27FC236}">
-                  <a16:creationId xmlns:a16="http://schemas.microsoft.com/office/drawing/2014/main" id="{07749573-D213-2495-12D9-1807D5048167}"/>
-                </a:ext>
-              </a:extLst>
-            </p:cNvPr>
-            <p:cNvSpPr>
-              <a:spLocks noChangeAspect="1"/>
-            </p:cNvSpPr>
-            <p:nvPr/>
-          </p:nvSpPr>
-          <p:spPr>
-            <a:xfrm>
-              <a:off x="3522175" y="1950278"/>
-              <a:ext cx="1620000" cy="1080000"/>
-            </a:xfrm>
-            <a:prstGeom prst="rect">
-              <a:avLst/>
-            </a:prstGeom>
-            <a:solidFill>
-              <a:schemeClr val="bg1"/>
-            </a:solidFill>
-            <a:ln>
-              <a:solidFill>
-                <a:schemeClr val="tx1"/>
-              </a:solidFill>
-            </a:ln>
-          </p:spPr>
-          <p:style>
-            <a:lnRef idx="2">
-              <a:schemeClr val="accent1">
-                <a:shade val="15000"/>
-              </a:schemeClr>
-            </a:lnRef>
-            <a:fillRef idx="1">
-              <a:schemeClr val="accent1"/>
-            </a:fillRef>
-            <a:effectRef idx="0">
-              <a:schemeClr val="accent1"/>
-            </a:effectRef>
-            <a:fontRef idx="minor">
-              <a:schemeClr val="lt1"/>
-            </a:fontRef>
-          </p:style>
-          <p:txBody>
-            <a:bodyPr rtlCol="0" anchor="ctr"/>
-            <a:lstStyle/>
-            <a:p>
-              <a:pPr algn="r"/>
-              <a:endParaRPr lang="ko-KR" altLang="en-US" sz="1801" dirty="0"/>
-            </a:p>
-          </p:txBody>
-        </p:sp>
-        <p:sp>
-          <p:nvSpPr>
-            <p:cNvPr id="8" name="직사각형 7">
-              <a:extLst>
-                <a:ext uri="{FF2B5EF4-FFF2-40B4-BE49-F238E27FC236}">
-                  <a16:creationId xmlns:a16="http://schemas.microsoft.com/office/drawing/2014/main" id="{28028F3D-3D20-3B3A-714E-E095834DCCE9}"/>
-                </a:ext>
-              </a:extLst>
-            </p:cNvPr>
-            <p:cNvSpPr>
-              <a:spLocks noChangeAspect="1"/>
-            </p:cNvSpPr>
-            <p:nvPr/>
-          </p:nvSpPr>
-          <p:spPr>
-            <a:xfrm>
-              <a:off x="3522175" y="3133149"/>
-              <a:ext cx="1620000" cy="1080000"/>
-            </a:xfrm>
-            <a:prstGeom prst="rect">
-              <a:avLst/>
-            </a:prstGeom>
-            <a:solidFill>
-              <a:schemeClr val="bg1"/>
-            </a:solidFill>
-            <a:ln>
-              <a:solidFill>
-                <a:schemeClr val="tx1"/>
-              </a:solidFill>
-            </a:ln>
-          </p:spPr>
-          <p:style>
-            <a:lnRef idx="2">
-              <a:schemeClr val="accent1">
-                <a:shade val="15000"/>
-              </a:schemeClr>
-            </a:lnRef>
-            <a:fillRef idx="1">
-              <a:schemeClr val="accent1"/>
-            </a:fillRef>
-            <a:effectRef idx="0">
-              <a:schemeClr val="accent1"/>
-            </a:effectRef>
-            <a:fontRef idx="minor">
-              <a:schemeClr val="lt1"/>
-            </a:fontRef>
-          </p:style>
-          <p:txBody>
-            <a:bodyPr rtlCol="0" anchor="ctr"/>
-            <a:lstStyle/>
-            <a:p>
-              <a:pPr algn="r"/>
-              <a:endParaRPr lang="ko-KR" altLang="en-US" sz="1801" dirty="0"/>
-            </a:p>
-          </p:txBody>
-        </p:sp>
-        <p:sp>
-          <p:nvSpPr>
-            <p:cNvPr id="9" name="직사각형 8">
-              <a:extLst>
-                <a:ext uri="{FF2B5EF4-FFF2-40B4-BE49-F238E27FC236}">
-                  <a16:creationId xmlns:a16="http://schemas.microsoft.com/office/drawing/2014/main" id="{35CCF390-395E-DD3C-390B-A5ED015359A9}"/>
-                </a:ext>
-              </a:extLst>
-            </p:cNvPr>
-            <p:cNvSpPr>
-              <a:spLocks noChangeAspect="1"/>
-            </p:cNvSpPr>
-            <p:nvPr/>
-          </p:nvSpPr>
-          <p:spPr>
-            <a:xfrm>
-              <a:off x="3522175" y="4316018"/>
-              <a:ext cx="1620000" cy="1080000"/>
-            </a:xfrm>
-            <a:prstGeom prst="rect">
-              <a:avLst/>
-            </a:prstGeom>
-            <a:solidFill>
-              <a:schemeClr val="bg1"/>
-            </a:solidFill>
-            <a:ln>
-              <a:solidFill>
-                <a:schemeClr val="tx1"/>
-              </a:solidFill>
-            </a:ln>
-          </p:spPr>
-          <p:style>
-            <a:lnRef idx="2">
-              <a:schemeClr val="accent1">
-                <a:shade val="15000"/>
-              </a:schemeClr>
-            </a:lnRef>
-            <a:fillRef idx="1">
-              <a:schemeClr val="accent1"/>
-            </a:fillRef>
-            <a:effectRef idx="0">
-              <a:schemeClr val="accent1"/>
-            </a:effectRef>
-            <a:fontRef idx="minor">
-              <a:schemeClr val="lt1"/>
-            </a:fontRef>
-          </p:style>
-          <p:txBody>
-            <a:bodyPr rtlCol="0" anchor="ctr"/>
-            <a:lstStyle/>
-            <a:p>
-              <a:pPr algn="r"/>
-              <a:endParaRPr lang="ko-KR" altLang="en-US" sz="1801" dirty="0"/>
-            </a:p>
-          </p:txBody>
-        </p:sp>
-        <p:sp>
-          <p:nvSpPr>
-            <p:cNvPr id="10" name="직사각형 9">
-              <a:extLst>
-                <a:ext uri="{FF2B5EF4-FFF2-40B4-BE49-F238E27FC236}">
-                  <a16:creationId xmlns:a16="http://schemas.microsoft.com/office/drawing/2014/main" id="{5DE79028-E83D-8F24-1955-66832FDC0D73}"/>
-                </a:ext>
-              </a:extLst>
-            </p:cNvPr>
-            <p:cNvSpPr>
-              <a:spLocks noChangeAspect="1"/>
-            </p:cNvSpPr>
-            <p:nvPr/>
-          </p:nvSpPr>
-          <p:spPr>
-            <a:xfrm>
-              <a:off x="3700352" y="5563875"/>
-              <a:ext cx="1257300" cy="389040"/>
-            </a:xfrm>
-            <a:prstGeom prst="rect">
-              <a:avLst/>
-            </a:prstGeom>
-            <a:solidFill>
-              <a:schemeClr val="bg1"/>
-            </a:solidFill>
-            <a:ln>
-              <a:noFill/>
-            </a:ln>
-          </p:spPr>
-          <p:style>
-            <a:lnRef idx="2">
-              <a:schemeClr val="accent1">
-                <a:shade val="15000"/>
-              </a:schemeClr>
-            </a:lnRef>
-            <a:fillRef idx="1">
-              <a:schemeClr val="accent1"/>
-            </a:fillRef>
-            <a:effectRef idx="0">
-              <a:schemeClr val="accent1"/>
-            </a:effectRef>
-            <a:fontRef idx="minor">
-              <a:schemeClr val="lt1"/>
-            </a:fontRef>
-          </p:style>
-          <p:txBody>
-            <a:bodyPr rtlCol="0" anchor="ctr"/>
-            <a:lstStyle/>
-            <a:p>
-              <a:pPr algn="ctr"/>
-              <a:r>
-                <a:rPr lang="ko-KR" altLang="en-US" sz="2800" dirty="0" err="1">
-                  <a:solidFill>
-                    <a:schemeClr val="tx1"/>
-                  </a:solidFill>
-                  <a:latin typeface="ONE 모바일고딕 Title OTF" panose="00000500000000000000" pitchFamily="50" charset="-127"/>
-                  <a:ea typeface="ONE 모바일고딕 Title OTF" panose="00000500000000000000" pitchFamily="50" charset="-127"/>
-                </a:rPr>
-                <a:t>용중네컷</a:t>
-              </a:r>
-              <a:endParaRPr lang="ko-KR" altLang="en-US" sz="2800" dirty="0">
-                <a:solidFill>
-                  <a:schemeClr val="tx1"/>
-                </a:solidFill>
-                <a:latin typeface="ONE 모바일고딕 Title OTF" panose="00000500000000000000" pitchFamily="50" charset="-127"/>
-                <a:ea typeface="ONE 모바일고딕 Title OTF" panose="00000500000000000000" pitchFamily="50" charset="-127"/>
-              </a:endParaRPr>
-            </a:p>
-          </p:txBody>
-        </p:sp>
-      </p:grpSp>
-    </p:spTree>
-    <p:extLst>
-      <p:ext uri="{BB962C8B-B14F-4D97-AF65-F5344CB8AC3E}">
-        <p14:creationId xmlns:p14="http://schemas.microsoft.com/office/powerpoint/2010/main" val="1344349948"/>
+        <p14:creationId xmlns:p14="http://schemas.microsoft.com/office/powerpoint/2010/main" val="1570552920"/>
       </p:ext>
     </p:extLst>
   </p:cSld>

</xml_diff>